<commit_message>
bug5960: improved slides for new course configuration editor
</commit_message>
<xml_diff>
--- a/wiki/coursecreation/Mockups-Course-Creator.pptx
+++ b/wiki/coursecreation/Mockups-Course-Creator.pptx
@@ -2781,7 +2781,139 @@
               <a:rPr b="0" lang="en-US" sz="1800" spc="-1" strike="noStrike">
                 <a:latin typeface="Arial"/>
               </a:rPr>
-              <a:t>Click to edit the title text format</a:t>
+              <a:t>C</a:t>
+            </a:r>
+            <a:r>
+              <a:rPr b="0" lang="en-US" sz="1800" spc="-1" strike="noStrike">
+                <a:latin typeface="Arial"/>
+              </a:rPr>
+              <a:t>li</a:t>
+            </a:r>
+            <a:r>
+              <a:rPr b="0" lang="en-US" sz="1800" spc="-1" strike="noStrike">
+                <a:latin typeface="Arial"/>
+              </a:rPr>
+              <a:t>c</a:t>
+            </a:r>
+            <a:r>
+              <a:rPr b="0" lang="en-US" sz="1800" spc="-1" strike="noStrike">
+                <a:latin typeface="Arial"/>
+              </a:rPr>
+              <a:t>k </a:t>
+            </a:r>
+            <a:r>
+              <a:rPr b="0" lang="en-US" sz="1800" spc="-1" strike="noStrike">
+                <a:latin typeface="Arial"/>
+              </a:rPr>
+              <a:t>t</a:t>
+            </a:r>
+            <a:r>
+              <a:rPr b="0" lang="en-US" sz="1800" spc="-1" strike="noStrike">
+                <a:latin typeface="Arial"/>
+              </a:rPr>
+              <a:t>o </a:t>
+            </a:r>
+            <a:r>
+              <a:rPr b="0" lang="en-US" sz="1800" spc="-1" strike="noStrike">
+                <a:latin typeface="Arial"/>
+              </a:rPr>
+              <a:t>e</a:t>
+            </a:r>
+            <a:r>
+              <a:rPr b="0" lang="en-US" sz="1800" spc="-1" strike="noStrike">
+                <a:latin typeface="Arial"/>
+              </a:rPr>
+              <a:t>di</a:t>
+            </a:r>
+            <a:r>
+              <a:rPr b="0" lang="en-US" sz="1800" spc="-1" strike="noStrike">
+                <a:latin typeface="Arial"/>
+              </a:rPr>
+              <a:t>t </a:t>
+            </a:r>
+            <a:r>
+              <a:rPr b="0" lang="en-US" sz="1800" spc="-1" strike="noStrike">
+                <a:latin typeface="Arial"/>
+              </a:rPr>
+              <a:t>t</a:t>
+            </a:r>
+            <a:r>
+              <a:rPr b="0" lang="en-US" sz="1800" spc="-1" strike="noStrike">
+                <a:latin typeface="Arial"/>
+              </a:rPr>
+              <a:t>h</a:t>
+            </a:r>
+            <a:r>
+              <a:rPr b="0" lang="en-US" sz="1800" spc="-1" strike="noStrike">
+                <a:latin typeface="Arial"/>
+              </a:rPr>
+              <a:t>e </a:t>
+            </a:r>
+            <a:r>
+              <a:rPr b="0" lang="en-US" sz="1800" spc="-1" strike="noStrike">
+                <a:latin typeface="Arial"/>
+              </a:rPr>
+              <a:t>tit</a:t>
+            </a:r>
+            <a:r>
+              <a:rPr b="0" lang="en-US" sz="1800" spc="-1" strike="noStrike">
+                <a:latin typeface="Arial"/>
+              </a:rPr>
+              <a:t>le </a:t>
+            </a:r>
+            <a:r>
+              <a:rPr b="0" lang="en-US" sz="1800" spc="-1" strike="noStrike">
+                <a:latin typeface="Arial"/>
+              </a:rPr>
+              <a:t>t</a:t>
+            </a:r>
+            <a:r>
+              <a:rPr b="0" lang="en-US" sz="1800" spc="-1" strike="noStrike">
+                <a:latin typeface="Arial"/>
+              </a:rPr>
+              <a:t>e</a:t>
+            </a:r>
+            <a:r>
+              <a:rPr b="0" lang="en-US" sz="1800" spc="-1" strike="noStrike">
+                <a:latin typeface="Arial"/>
+              </a:rPr>
+              <a:t>xt </a:t>
+            </a:r>
+            <a:r>
+              <a:rPr b="0" lang="en-US" sz="1800" spc="-1" strike="noStrike">
+                <a:latin typeface="Arial"/>
+              </a:rPr>
+              <a:t>f</a:t>
+            </a:r>
+            <a:r>
+              <a:rPr b="0" lang="en-US" sz="1800" spc="-1" strike="noStrike">
+                <a:latin typeface="Arial"/>
+              </a:rPr>
+              <a:t>o</a:t>
+            </a:r>
+            <a:r>
+              <a:rPr b="0" lang="en-US" sz="1800" spc="-1" strike="noStrike">
+                <a:latin typeface="Arial"/>
+              </a:rPr>
+              <a:t>r</a:t>
+            </a:r>
+            <a:r>
+              <a:rPr b="0" lang="en-US" sz="1800" spc="-1" strike="noStrike">
+                <a:latin typeface="Arial"/>
+              </a:rPr>
+              <a:t>m</a:t>
+            </a:r>
+            <a:r>
+              <a:rPr b="0" lang="en-US" sz="1800" spc="-1" strike="noStrike">
+                <a:latin typeface="Arial"/>
+              </a:rPr>
+              <a:t>a</a:t>
+            </a:r>
+            <a:r>
+              <a:rPr b="0" lang="en-US" sz="1800" spc="-1" strike="noStrike">
+                <a:latin typeface="Arial"/>
+              </a:rPr>
+              <a:t>t</a:t>
             </a:r>
             <a:endParaRPr b="0" lang="en-US" sz="1800" spc="-1" strike="noStrike">
               <a:latin typeface="Arial"/>
@@ -3040,7 +3172,211 @@
               <a:rPr b="0" lang="en-US" sz="1800" spc="-1" strike="noStrike">
                 <a:latin typeface="Arial"/>
               </a:rPr>
-              <a:t>Click to edit the title text format</a:t>
+              <a:t>C</a:t>
+            </a:r>
+            <a:r>
+              <a:rPr b="0" lang="en-US" sz="1800" spc="-1" strike="noStrike">
+                <a:latin typeface="Arial"/>
+              </a:rPr>
+              <a:t>l</a:t>
+            </a:r>
+            <a:r>
+              <a:rPr b="0" lang="en-US" sz="1800" spc="-1" strike="noStrike">
+                <a:latin typeface="Arial"/>
+              </a:rPr>
+              <a:t>i</a:t>
+            </a:r>
+            <a:r>
+              <a:rPr b="0" lang="en-US" sz="1800" spc="-1" strike="noStrike">
+                <a:latin typeface="Arial"/>
+              </a:rPr>
+              <a:t>c</a:t>
+            </a:r>
+            <a:r>
+              <a:rPr b="0" lang="en-US" sz="1800" spc="-1" strike="noStrike">
+                <a:latin typeface="Arial"/>
+              </a:rPr>
+              <a:t>k</a:t>
+            </a:r>
+            <a:r>
+              <a:rPr b="0" lang="en-US" sz="1800" spc="-1" strike="noStrike">
+                <a:latin typeface="Arial"/>
+              </a:rPr>
+              <a:t> </a:t>
+            </a:r>
+            <a:r>
+              <a:rPr b="0" lang="en-US" sz="1800" spc="-1" strike="noStrike">
+                <a:latin typeface="Arial"/>
+              </a:rPr>
+              <a:t>t</a:t>
+            </a:r>
+            <a:r>
+              <a:rPr b="0" lang="en-US" sz="1800" spc="-1" strike="noStrike">
+                <a:latin typeface="Arial"/>
+              </a:rPr>
+              <a:t>o</a:t>
+            </a:r>
+            <a:r>
+              <a:rPr b="0" lang="en-US" sz="1800" spc="-1" strike="noStrike">
+                <a:latin typeface="Arial"/>
+              </a:rPr>
+              <a:t> </a:t>
+            </a:r>
+            <a:r>
+              <a:rPr b="0" lang="en-US" sz="1800" spc="-1" strike="noStrike">
+                <a:latin typeface="Arial"/>
+              </a:rPr>
+              <a:t>e</a:t>
+            </a:r>
+            <a:r>
+              <a:rPr b="0" lang="en-US" sz="1800" spc="-1" strike="noStrike">
+                <a:latin typeface="Arial"/>
+              </a:rPr>
+              <a:t>d</a:t>
+            </a:r>
+            <a:r>
+              <a:rPr b="0" lang="en-US" sz="1800" spc="-1" strike="noStrike">
+                <a:latin typeface="Arial"/>
+              </a:rPr>
+              <a:t>i</a:t>
+            </a:r>
+            <a:r>
+              <a:rPr b="0" lang="en-US" sz="1800" spc="-1" strike="noStrike">
+                <a:latin typeface="Arial"/>
+              </a:rPr>
+              <a:t>t</a:t>
+            </a:r>
+            <a:r>
+              <a:rPr b="0" lang="en-US" sz="1800" spc="-1" strike="noStrike">
+                <a:latin typeface="Arial"/>
+              </a:rPr>
+              <a:t> </a:t>
+            </a:r>
+            <a:r>
+              <a:rPr b="0" lang="en-US" sz="1800" spc="-1" strike="noStrike">
+                <a:latin typeface="Arial"/>
+              </a:rPr>
+              <a:t>t</a:t>
+            </a:r>
+            <a:r>
+              <a:rPr b="0" lang="en-US" sz="1800" spc="-1" strike="noStrike">
+                <a:latin typeface="Arial"/>
+              </a:rPr>
+              <a:t>h</a:t>
+            </a:r>
+            <a:r>
+              <a:rPr b="0" lang="en-US" sz="1800" spc="-1" strike="noStrike">
+                <a:latin typeface="Arial"/>
+              </a:rPr>
+              <a:t>e</a:t>
+            </a:r>
+            <a:r>
+              <a:rPr b="0" lang="en-US" sz="1800" spc="-1" strike="noStrike">
+                <a:latin typeface="Arial"/>
+              </a:rPr>
+              <a:t> </a:t>
+            </a:r>
+            <a:r>
+              <a:rPr b="0" lang="en-US" sz="1800" spc="-1" strike="noStrike">
+                <a:latin typeface="Arial"/>
+              </a:rPr>
+              <a:t>t</a:t>
+            </a:r>
+            <a:r>
+              <a:rPr b="0" lang="en-US" sz="1800" spc="-1" strike="noStrike">
+                <a:latin typeface="Arial"/>
+              </a:rPr>
+              <a:t>i</a:t>
+            </a:r>
+            <a:r>
+              <a:rPr b="0" lang="en-US" sz="1800" spc="-1" strike="noStrike">
+                <a:latin typeface="Arial"/>
+              </a:rPr>
+              <a:t>t</a:t>
+            </a:r>
+            <a:r>
+              <a:rPr b="0" lang="en-US" sz="1800" spc="-1" strike="noStrike">
+                <a:latin typeface="Arial"/>
+              </a:rPr>
+              <a:t>l</a:t>
+            </a:r>
+            <a:r>
+              <a:rPr b="0" lang="en-US" sz="1800" spc="-1" strike="noStrike">
+                <a:latin typeface="Arial"/>
+              </a:rPr>
+              <a:t>e</a:t>
+            </a:r>
+            <a:r>
+              <a:rPr b="0" lang="en-US" sz="1800" spc="-1" strike="noStrike">
+                <a:latin typeface="Arial"/>
+              </a:rPr>
+              <a:t> </a:t>
+            </a:r>
+            <a:r>
+              <a:rPr b="0" lang="en-US" sz="1800" spc="-1" strike="noStrike">
+                <a:latin typeface="Arial"/>
+              </a:rPr>
+              <a:t>t</a:t>
+            </a:r>
+            <a:r>
+              <a:rPr b="0" lang="en-US" sz="1800" spc="-1" strike="noStrike">
+                <a:latin typeface="Arial"/>
+              </a:rPr>
+              <a:t>e</a:t>
+            </a:r>
+            <a:r>
+              <a:rPr b="0" lang="en-US" sz="1800" spc="-1" strike="noStrike">
+                <a:latin typeface="Arial"/>
+              </a:rPr>
+              <a:t>x</a:t>
+            </a:r>
+            <a:r>
+              <a:rPr b="0" lang="en-US" sz="1800" spc="-1" strike="noStrike">
+                <a:latin typeface="Arial"/>
+              </a:rPr>
+              <a:t>t</a:t>
+            </a:r>
+            <a:r>
+              <a:rPr b="0" lang="en-US" sz="1800" spc="-1" strike="noStrike">
+                <a:latin typeface="Arial"/>
+              </a:rPr>
+              <a:t> </a:t>
+            </a:r>
+            <a:r>
+              <a:rPr b="0" lang="en-US" sz="1800" spc="-1" strike="noStrike">
+                <a:latin typeface="Arial"/>
+              </a:rPr>
+              <a:t>f</a:t>
+            </a:r>
+            <a:r>
+              <a:rPr b="0" lang="en-US" sz="1800" spc="-1" strike="noStrike">
+                <a:latin typeface="Arial"/>
+              </a:rPr>
+              <a:t>o</a:t>
+            </a:r>
+            <a:r>
+              <a:rPr b="0" lang="en-US" sz="1800" spc="-1" strike="noStrike">
+                <a:latin typeface="Arial"/>
+              </a:rPr>
+              <a:t>r</a:t>
+            </a:r>
+            <a:r>
+              <a:rPr b="0" lang="en-US" sz="1800" spc="-1" strike="noStrike">
+                <a:latin typeface="Arial"/>
+              </a:rPr>
+              <a:t>m</a:t>
+            </a:r>
+            <a:r>
+              <a:rPr b="0" lang="en-US" sz="1800" spc="-1" strike="noStrike">
+                <a:latin typeface="Arial"/>
+              </a:rPr>
+              <a:t>a</a:t>
+            </a:r>
+            <a:r>
+              <a:rPr b="0" lang="en-US" sz="1800" spc="-1" strike="noStrike">
+                <a:latin typeface="Arial"/>
+              </a:rPr>
+              <a:t>t</a:t>
             </a:r>
             <a:endParaRPr b="0" lang="en-US" sz="1800" spc="-1" strike="noStrike">
               <a:latin typeface="Arial"/>
@@ -26872,7 +27208,19 @@
                 <a:rPr b="0" lang="en-US" sz="1100" spc="-1" strike="noStrike">
                   <a:latin typeface="Arial"/>
                 </a:rPr>
-                <a:t>Gate</a:t>
+                <a:t>G</a:t>
+              </a:r>
+              <a:r>
+                <a:rPr b="0" lang="en-US" sz="1100" spc="-1" strike="noStrike">
+                  <a:latin typeface="Arial"/>
+                </a:rPr>
+                <a:t>at</a:t>
+              </a:r>
+              <a:r>
+                <a:rPr b="0" lang="en-US" sz="1100" spc="-1" strike="noStrike">
+                  <a:latin typeface="Arial"/>
+                </a:rPr>
+                <a:t>e</a:t>
               </a:r>
               <a:endParaRPr b="0" lang="en-US" sz="1100" spc="-1" strike="noStrike">
                 <a:latin typeface="Arial"/>
@@ -27756,7 +28104,31 @@
                 <a:rPr b="0" lang="en-US" sz="1800" spc="-1" strike="noStrike">
                   <a:latin typeface="Arial"/>
                 </a:rPr>
-                <a:t>Store</a:t>
+                <a:t>S</a:t>
+              </a:r>
+              <a:r>
+                <a:rPr b="0" lang="en-US" sz="1800" spc="-1" strike="noStrike">
+                  <a:latin typeface="Arial"/>
+                </a:rPr>
+                <a:t>t</a:t>
+              </a:r>
+              <a:r>
+                <a:rPr b="0" lang="en-US" sz="1800" spc="-1" strike="noStrike">
+                  <a:latin typeface="Arial"/>
+                </a:rPr>
+                <a:t>o</a:t>
+              </a:r>
+              <a:r>
+                <a:rPr b="0" lang="en-US" sz="1800" spc="-1" strike="noStrike">
+                  <a:latin typeface="Arial"/>
+                </a:rPr>
+                <a:t>r</a:t>
+              </a:r>
+              <a:r>
+                <a:rPr b="0" lang="en-US" sz="1800" spc="-1" strike="noStrike">
+                  <a:latin typeface="Arial"/>
+                </a:rPr>
+                <a:t>e</a:t>
               </a:r>
               <a:endParaRPr b="0" lang="en-US" sz="1800" spc="-1" strike="noStrike">
                 <a:latin typeface="Arial"/>
@@ -34025,7 +34397,13 @@
               <a:rPr b="0" lang="en-US" sz="1800" spc="-1" strike="noStrike">
                 <a:latin typeface="Arial"/>
               </a:rPr>
-              <a:t>Yellow Bubble</a:t>
+              <a:t>Yellow </a:t>
+            </a:r>
+            <a:r>
+              <a:rPr b="0" lang="en-US" sz="1800" spc="-1" strike="noStrike">
+                <a:latin typeface="Arial"/>
+              </a:rPr>
+              <a:t>Bubble</a:t>
             </a:r>
             <a:endParaRPr b="0" lang="en-US" sz="1800" spc="-1" strike="noStrike">
               <a:latin typeface="Arial"/>

</xml_diff>